<commit_message>
Präsentation: updated Qualitätsmatrix + added Outro Slide
</commit_message>
<xml_diff>
--- a/Intelligent_Tanken.pptx
+++ b/Intelligent_Tanken.pptx
@@ -5,10 +5,10 @@
     <p:sldMasterId id="2147483648" r:id="rId4"/>
   </p:sldMasterIdLst>
   <p:notesMasterIdLst>
-    <p:notesMasterId r:id="rId12"/>
+    <p:notesMasterId r:id="rId14"/>
   </p:notesMasterIdLst>
   <p:handoutMasterIdLst>
-    <p:handoutMasterId r:id="rId13"/>
+    <p:handoutMasterId r:id="rId15"/>
   </p:handoutMasterIdLst>
   <p:sldIdLst>
     <p:sldId id="256" r:id="rId5"/>
@@ -16,8 +16,10 @@
     <p:sldId id="257" r:id="rId7"/>
     <p:sldId id="258" r:id="rId8"/>
     <p:sldId id="259" r:id="rId9"/>
-    <p:sldId id="261" r:id="rId10"/>
-    <p:sldId id="262" r:id="rId11"/>
+    <p:sldId id="263" r:id="rId10"/>
+    <p:sldId id="261" r:id="rId11"/>
+    <p:sldId id="262" r:id="rId12"/>
+    <p:sldId id="264" r:id="rId13"/>
   </p:sldIdLst>
   <p:sldSz cx="12192000" cy="6858000"/>
   <p:notesSz cx="6858000" cy="9144000"/>
@@ -232,7 +234,7 @@
           <a:p>
             <a:fld id="{BC4042E8-A934-4E93-8524-4DE0E2A1EBD4}" type="datetime1">
               <a:rPr lang="de-DE" smtClean="0"/>
-              <a:t>09.12.20</a:t>
+              <a:t>10.12.2020</a:t>
             </a:fld>
             <a:endParaRPr lang="de-DE" dirty="0"/>
           </a:p>
@@ -310,7 +312,7 @@
           <a:p>
             <a:fld id="{F97B81DA-4319-472A-BAB4-C6D52FFF1589}" type="slidenum">
               <a:rPr lang="de-DE" smtClean="0"/>
-              <a:t>‹#›</a:t>
+              <a:t>‹Nr.›</a:t>
             </a:fld>
             <a:endParaRPr lang="de-DE"/>
           </a:p>
@@ -410,7 +412,7 @@
             <a:fld id="{F1FEC863-2C79-4D85-8928-56AB8F3A9C87}" type="datetime1">
               <a:rPr lang="de-DE" noProof="0" smtClean="0"/>
               <a:pPr/>
-              <a:t>09.12.20</a:t>
+              <a:t>10.12.2020</a:t>
             </a:fld>
             <a:endParaRPr lang="de-DE" noProof="0"/>
           </a:p>
@@ -568,7 +570,7 @@
           <a:p>
             <a:fld id="{D23889FD-0077-42EF-9287-BC2F9203A53E}" type="slidenum">
               <a:rPr lang="de-DE" noProof="0" smtClean="0"/>
-              <a:t>‹#›</a:t>
+              <a:t>‹Nr.›</a:t>
             </a:fld>
             <a:endParaRPr lang="de-DE" noProof="0"/>
           </a:p>
@@ -1150,7 +1152,7 @@
             <a:pPr rtl="0"/>
             <a:fld id="{676B7F5A-5A95-4A34-B902-47BAF17A846D}" type="datetime1">
               <a:rPr lang="de-DE" noProof="0" smtClean="0"/>
-              <a:t>09.12.20</a:t>
+              <a:t>10.12.2020</a:t>
             </a:fld>
             <a:endParaRPr lang="de-DE" noProof="0"/>
           </a:p>
@@ -1194,7 +1196,7 @@
             <a:pPr rtl="0"/>
             <a:fld id="{D57F1E4F-1CFF-5643-939E-02111984F565}" type="slidenum">
               <a:rPr lang="de-DE" noProof="0" smtClean="0"/>
-              <a:t>‹#›</a:t>
+              <a:t>‹Nr.›</a:t>
             </a:fld>
             <a:endParaRPr lang="de-DE" noProof="0"/>
           </a:p>
@@ -1342,7 +1344,7 @@
             <a:pPr rtl="0"/>
             <a:fld id="{1225FD55-3229-4B68-BD74-B135798F57D0}" type="datetime1">
               <a:rPr lang="de-DE" noProof="0" smtClean="0"/>
-              <a:t>09.12.20</a:t>
+              <a:t>10.12.2020</a:t>
             </a:fld>
             <a:endParaRPr lang="de-DE" noProof="0"/>
           </a:p>
@@ -1386,7 +1388,7 @@
             <a:pPr rtl="0"/>
             <a:fld id="{D57F1E4F-1CFF-5643-939E-02111984F565}" type="slidenum">
               <a:rPr lang="de-DE" noProof="0" smtClean="0"/>
-              <a:t>‹#›</a:t>
+              <a:t>‹Nr.›</a:t>
             </a:fld>
             <a:endParaRPr lang="de-DE" noProof="0"/>
           </a:p>
@@ -1608,7 +1610,7 @@
             <a:pPr rtl="0"/>
             <a:fld id="{F82B210F-5DA6-44A8-9C4C-AF9CB46561A2}" type="datetime1">
               <a:rPr lang="de-DE" noProof="0" smtClean="0"/>
-              <a:t>09.12.20</a:t>
+              <a:t>10.12.2020</a:t>
             </a:fld>
             <a:endParaRPr lang="de-DE" noProof="0"/>
           </a:p>
@@ -1652,7 +1654,7 @@
             <a:pPr rtl="0"/>
             <a:fld id="{D57F1E4F-1CFF-5643-939E-02111984F565}" type="slidenum">
               <a:rPr lang="de-DE" noProof="0" smtClean="0"/>
-              <a:t>‹#›</a:t>
+              <a:t>‹Nr.›</a:t>
             </a:fld>
             <a:endParaRPr lang="de-DE" noProof="0"/>
           </a:p>
@@ -1943,7 +1945,7 @@
             <a:pPr rtl="0"/>
             <a:fld id="{25537EF0-BB7F-4777-A29A-E0AA2EFDD415}" type="datetime1">
               <a:rPr lang="de-DE" noProof="0" smtClean="0"/>
-              <a:t>09.12.20</a:t>
+              <a:t>10.12.2020</a:t>
             </a:fld>
             <a:endParaRPr lang="de-DE" noProof="0"/>
           </a:p>
@@ -1987,7 +1989,7 @@
             <a:pPr rtl="0"/>
             <a:fld id="{D57F1E4F-1CFF-5643-939E-02111984F565}" type="slidenum">
               <a:rPr lang="de-DE" noProof="0" smtClean="0"/>
-              <a:t>‹#›</a:t>
+              <a:t>‹Nr.›</a:t>
             </a:fld>
             <a:endParaRPr lang="de-DE" noProof="0"/>
           </a:p>
@@ -2551,7 +2553,7 @@
             <a:pPr rtl="0"/>
             <a:fld id="{B7E4E8A0-E3BB-4737-B800-B84A275E24C9}" type="datetime1">
               <a:rPr lang="de-DE" noProof="0" smtClean="0"/>
-              <a:t>09.12.20</a:t>
+              <a:t>10.12.2020</a:t>
             </a:fld>
             <a:endParaRPr lang="de-DE" noProof="0"/>
           </a:p>
@@ -2595,7 +2597,7 @@
             <a:pPr rtl="0"/>
             <a:fld id="{D57F1E4F-1CFF-5643-939E-02111984F565}" type="slidenum">
               <a:rPr lang="de-DE" noProof="0" smtClean="0"/>
-              <a:t>‹#›</a:t>
+              <a:t>‹Nr.›</a:t>
             </a:fld>
             <a:endParaRPr lang="de-DE" noProof="0"/>
           </a:p>
@@ -3396,7 +3398,7 @@
             <a:pPr rtl="0"/>
             <a:fld id="{46503A2F-9927-44F4-A849-763314F458A4}" type="datetime1">
               <a:rPr lang="de-DE" noProof="0" smtClean="0"/>
-              <a:t>09.12.20</a:t>
+              <a:t>10.12.2020</a:t>
             </a:fld>
             <a:endParaRPr lang="de-DE" noProof="0"/>
           </a:p>
@@ -3440,7 +3442,7 @@
             <a:pPr rtl="0"/>
             <a:fld id="{D57F1E4F-1CFF-5643-939E-02111984F565}" type="slidenum">
               <a:rPr lang="de-DE" noProof="0" smtClean="0"/>
-              <a:t>‹#›</a:t>
+              <a:t>‹Nr.›</a:t>
             </a:fld>
             <a:endParaRPr lang="de-DE" noProof="0"/>
           </a:p>
@@ -3563,7 +3565,7 @@
             <a:pPr rtl="0"/>
             <a:fld id="{28C69AEC-30D6-4C66-8AE0-6FF5D9D14014}" type="datetime1">
               <a:rPr lang="de-DE" noProof="0" smtClean="0"/>
-              <a:t>09.12.20</a:t>
+              <a:t>10.12.2020</a:t>
             </a:fld>
             <a:endParaRPr lang="de-DE" noProof="0"/>
           </a:p>
@@ -3607,7 +3609,7 @@
             <a:pPr rtl="0"/>
             <a:fld id="{D57F1E4F-1CFF-5643-939E-02111984F565}" type="slidenum">
               <a:rPr lang="de-DE" noProof="0" smtClean="0"/>
-              <a:t>‹#›</a:t>
+              <a:t>‹Nr.›</a:t>
             </a:fld>
             <a:endParaRPr lang="de-DE" noProof="0"/>
           </a:p>
@@ -3740,7 +3742,7 @@
             <a:pPr rtl="0"/>
             <a:fld id="{AD73C967-3582-4448-B223-7CBDE0D3BF8B}" type="datetime1">
               <a:rPr lang="de-DE" noProof="0" smtClean="0"/>
-              <a:t>09.12.20</a:t>
+              <a:t>10.12.2020</a:t>
             </a:fld>
             <a:endParaRPr lang="de-DE" noProof="0"/>
           </a:p>
@@ -3784,7 +3786,7 @@
             <a:pPr rtl="0"/>
             <a:fld id="{D57F1E4F-1CFF-5643-939E-02111984F565}" type="slidenum">
               <a:rPr lang="de-DE" noProof="0" smtClean="0"/>
-              <a:t>‹#›</a:t>
+              <a:t>‹Nr.›</a:t>
             </a:fld>
             <a:endParaRPr lang="de-DE" noProof="0"/>
           </a:p>
@@ -3907,7 +3909,7 @@
             <a:pPr rtl="0"/>
             <a:fld id="{729B53DF-F03E-4387-BEB9-895FAC4E804B}" type="datetime1">
               <a:rPr lang="de-DE" noProof="0" smtClean="0"/>
-              <a:t>09.12.20</a:t>
+              <a:t>10.12.2020</a:t>
             </a:fld>
             <a:endParaRPr lang="de-DE" noProof="0"/>
           </a:p>
@@ -3951,7 +3953,7 @@
             <a:pPr rtl="0"/>
             <a:fld id="{D57F1E4F-1CFF-5643-939E-02111984F565}" type="slidenum">
               <a:rPr lang="de-DE" noProof="0" smtClean="0"/>
-              <a:t>‹#›</a:t>
+              <a:t>‹Nr.›</a:t>
             </a:fld>
             <a:endParaRPr lang="de-DE" noProof="0"/>
           </a:p>
@@ -4149,7 +4151,7 @@
             <a:pPr rtl="0"/>
             <a:fld id="{81FF825D-DF9F-463D-B978-D4A913187850}" type="datetime1">
               <a:rPr lang="de-DE" noProof="0" smtClean="0"/>
-              <a:t>09.12.20</a:t>
+              <a:t>10.12.2020</a:t>
             </a:fld>
             <a:endParaRPr lang="de-DE" noProof="0"/>
           </a:p>
@@ -4193,7 +4195,7 @@
             <a:pPr rtl="0"/>
             <a:fld id="{D57F1E4F-1CFF-5643-939E-02111984F565}" type="slidenum">
               <a:rPr lang="de-DE" noProof="0" smtClean="0"/>
-              <a:t>‹#›</a:t>
+              <a:t>‹Nr.›</a:t>
             </a:fld>
             <a:endParaRPr lang="de-DE" noProof="0"/>
           </a:p>
@@ -4437,7 +4439,7 @@
             <a:pPr rtl="0"/>
             <a:fld id="{E0D35EC5-7FBE-4888-A663-A66E5857CBB3}" type="datetime1">
               <a:rPr lang="de-DE" noProof="0" smtClean="0"/>
-              <a:t>09.12.20</a:t>
+              <a:t>10.12.2020</a:t>
             </a:fld>
             <a:endParaRPr lang="de-DE" noProof="0"/>
           </a:p>
@@ -4481,7 +4483,7 @@
             <a:pPr rtl="0"/>
             <a:fld id="{D57F1E4F-1CFF-5643-939E-02111984F565}" type="slidenum">
               <a:rPr lang="de-DE" noProof="0" smtClean="0"/>
-              <a:t>‹#›</a:t>
+              <a:t>‹Nr.›</a:t>
             </a:fld>
             <a:endParaRPr lang="de-DE" noProof="0"/>
           </a:p>
@@ -4871,7 +4873,7 @@
             <a:pPr rtl="0"/>
             <a:fld id="{DACF6981-2D0D-4CE2-A8C5-EF21CA103A18}" type="datetime1">
               <a:rPr lang="de-DE" noProof="0" smtClean="0"/>
-              <a:t>09.12.20</a:t>
+              <a:t>10.12.2020</a:t>
             </a:fld>
             <a:endParaRPr lang="de-DE" noProof="0"/>
           </a:p>
@@ -4915,7 +4917,7 @@
             <a:pPr rtl="0"/>
             <a:fld id="{D57F1E4F-1CFF-5643-939E-02111984F565}" type="slidenum">
               <a:rPr lang="de-DE" noProof="0" smtClean="0"/>
-              <a:t>‹#›</a:t>
+              <a:t>‹Nr.›</a:t>
             </a:fld>
             <a:endParaRPr lang="de-DE" noProof="0"/>
           </a:p>
@@ -4987,7 +4989,7 @@
             <a:pPr rtl="0"/>
             <a:fld id="{2C813FFC-1972-440D-844B-76254FE26AD7}" type="datetime1">
               <a:rPr lang="de-DE" noProof="0" smtClean="0"/>
-              <a:t>09.12.20</a:t>
+              <a:t>10.12.2020</a:t>
             </a:fld>
             <a:endParaRPr lang="de-DE" noProof="0"/>
           </a:p>
@@ -5031,7 +5033,7 @@
             <a:pPr rtl="0"/>
             <a:fld id="{D57F1E4F-1CFF-5643-939E-02111984F565}" type="slidenum">
               <a:rPr lang="de-DE" noProof="0" smtClean="0"/>
-              <a:t>‹#›</a:t>
+              <a:t>‹Nr.›</a:t>
             </a:fld>
             <a:endParaRPr lang="de-DE" noProof="0"/>
           </a:p>
@@ -5080,7 +5082,7 @@
             <a:pPr rtl="0"/>
             <a:fld id="{D0802C0F-4692-4C21-A3BF-846BA9AD4CFD}" type="datetime1">
               <a:rPr lang="de-DE" noProof="0" smtClean="0"/>
-              <a:t>09.12.20</a:t>
+              <a:t>10.12.2020</a:t>
             </a:fld>
             <a:endParaRPr lang="de-DE" noProof="0"/>
           </a:p>
@@ -5124,7 +5126,7 @@
             <a:pPr rtl="0"/>
             <a:fld id="{D57F1E4F-1CFF-5643-939E-02111984F565}" type="slidenum">
               <a:rPr lang="de-DE" noProof="0" smtClean="0"/>
-              <a:t>‹#›</a:t>
+              <a:t>‹Nr.›</a:t>
             </a:fld>
             <a:endParaRPr lang="de-DE" noProof="0"/>
           </a:p>
@@ -5356,7 +5358,7 @@
             <a:pPr rtl="0"/>
             <a:fld id="{B792D4D1-2B4D-4B0D-942F-2FC92EFB1E7C}" type="datetime1">
               <a:rPr lang="de-DE" noProof="0" smtClean="0"/>
-              <a:t>09.12.20</a:t>
+              <a:t>10.12.2020</a:t>
             </a:fld>
             <a:endParaRPr lang="de-DE" noProof="0"/>
           </a:p>
@@ -5400,7 +5402,7 @@
             <a:pPr rtl="0"/>
             <a:fld id="{D57F1E4F-1CFF-5643-939E-02111984F565}" type="slidenum">
               <a:rPr lang="de-DE" noProof="0" smtClean="0"/>
-              <a:t>‹#›</a:t>
+              <a:t>‹Nr.›</a:t>
             </a:fld>
             <a:endParaRPr lang="de-DE" noProof="0"/>
           </a:p>
@@ -5629,7 +5631,7 @@
             <a:pPr rtl="0"/>
             <a:fld id="{AC73558F-E39C-459D-9466-8927943E4A92}" type="datetime1">
               <a:rPr lang="de-DE" noProof="0" smtClean="0"/>
-              <a:t>09.12.20</a:t>
+              <a:t>10.12.2020</a:t>
             </a:fld>
             <a:endParaRPr lang="de-DE" noProof="0"/>
           </a:p>
@@ -5673,7 +5675,7 @@
             <a:pPr rtl="0"/>
             <a:fld id="{D57F1E4F-1CFF-5643-939E-02111984F565}" type="slidenum">
               <a:rPr lang="de-DE" noProof="0" smtClean="0"/>
-              <a:t>‹#›</a:t>
+              <a:t>‹Nr.›</a:t>
             </a:fld>
             <a:endParaRPr lang="de-DE" noProof="0"/>
           </a:p>
@@ -6055,7 +6057,7 @@
             <a:pPr rtl="0"/>
             <a:fld id="{3BE64BA8-F420-4CC6-A0E8-1A7F7A416A9F}" type="datetime1">
               <a:rPr lang="de-DE" noProof="0" smtClean="0"/>
-              <a:t>09.12.20</a:t>
+              <a:t>10.12.2020</a:t>
             </a:fld>
             <a:endParaRPr lang="de-DE" noProof="0"/>
           </a:p>
@@ -6136,7 +6138,7 @@
             <a:pPr rtl="0"/>
             <a:fld id="{D57F1E4F-1CFF-5643-939E-02111984F565}" type="slidenum">
               <a:rPr lang="de-DE" noProof="0" smtClean="0"/>
-              <a:t>‹#›</a:t>
+              <a:t>‹Nr.›</a:t>
             </a:fld>
             <a:endParaRPr lang="de-DE" noProof="0"/>
           </a:p>
@@ -9344,43 +9346,215 @@
           </a:p>
         </p:txBody>
       </p:sp>
-      <p:pic>
-        <p:nvPicPr>
-          <p:cNvPr id="5" name="Content Placeholder 4" descr="A picture containing white&#10;&#10;Description automatically generated">
+      <p:sp>
+        <p:nvSpPr>
+          <p:cNvPr id="3" name="Textfeld 2">
             <a:extLst>
               <a:ext uri="{FF2B5EF4-FFF2-40B4-BE49-F238E27FC236}">
-                <a16:creationId xmlns:a16="http://schemas.microsoft.com/office/drawing/2014/main" id="{D6BE296C-4299-B047-99F6-EE7C77EEA6E5}"/>
+                <a16:creationId xmlns:a16="http://schemas.microsoft.com/office/drawing/2014/main" id="{F41A1EB4-3BC0-4682-AD3A-B58463011970}"/>
               </a:ext>
             </a:extLst>
           </p:cNvPr>
-          <p:cNvPicPr>
-            <a:picLocks noGrp="1" noChangeAspect="1"/>
-          </p:cNvPicPr>
-          <p:nvPr>
-            <p:ph idx="1"/>
-          </p:nvPr>
-        </p:nvPicPr>
-        <p:blipFill>
-          <a:blip r:embed="rId7"/>
-          <a:stretch>
-            <a:fillRect/>
-          </a:stretch>
-        </p:blipFill>
+          <p:cNvSpPr txBox="1"/>
+          <p:nvPr/>
+        </p:nvSpPr>
         <p:spPr>
           <a:xfrm>
-            <a:off x="309539" y="406896"/>
-            <a:ext cx="11257963" cy="3461822"/>
+            <a:off x="761206" y="504270"/>
+            <a:ext cx="7205723" cy="3046988"/>
           </a:xfrm>
           <a:prstGeom prst="rect">
             <a:avLst/>
           </a:prstGeom>
-          <a:effectLst/>
+          <a:noFill/>
         </p:spPr>
-      </p:pic>
+        <p:txBody>
+          <a:bodyPr wrap="square" rtlCol="0">
+            <a:spAutoFit/>
+          </a:bodyPr>
+          <a:lstStyle/>
+          <a:p>
+            <a:pPr marL="457200" marR="0" indent="-457200">
+              <a:spcBef>
+                <a:spcPts val="0"/>
+              </a:spcBef>
+              <a:spcAft>
+                <a:spcPts val="0"/>
+              </a:spcAft>
+              <a:buFont typeface="+mj-lt"/>
+              <a:buAutoNum type="arabicPeriod"/>
+            </a:pPr>
+            <a:r>
+              <a:rPr lang="en-US" sz="2400" dirty="0">
+                <a:solidFill>
+                  <a:schemeClr val="bg1"/>
+                </a:solidFill>
+                <a:effectLst/>
+                <a:latin typeface="Calibri" panose="020F0502020204030204" pitchFamily="34" charset="0"/>
+              </a:rPr>
+              <a:t>Functional Stability </a:t>
+            </a:r>
+          </a:p>
+          <a:p>
+            <a:pPr marL="457200" marR="0" indent="-457200">
+              <a:spcBef>
+                <a:spcPts val="0"/>
+              </a:spcBef>
+              <a:spcAft>
+                <a:spcPts val="0"/>
+              </a:spcAft>
+              <a:buFont typeface="+mj-lt"/>
+              <a:buAutoNum type="arabicPeriod"/>
+            </a:pPr>
+            <a:r>
+              <a:rPr lang="en-US" sz="2400" dirty="0">
+                <a:solidFill>
+                  <a:schemeClr val="bg1"/>
+                </a:solidFill>
+                <a:effectLst/>
+                <a:latin typeface="Calibri" panose="020F0502020204030204" pitchFamily="34" charset="0"/>
+              </a:rPr>
+              <a:t>Usability </a:t>
+            </a:r>
+          </a:p>
+          <a:p>
+            <a:pPr marL="457200" marR="0" indent="-457200">
+              <a:spcBef>
+                <a:spcPts val="0"/>
+              </a:spcBef>
+              <a:spcAft>
+                <a:spcPts val="0"/>
+              </a:spcAft>
+              <a:buFont typeface="+mj-lt"/>
+              <a:buAutoNum type="arabicPeriod"/>
+            </a:pPr>
+            <a:r>
+              <a:rPr lang="en-US" sz="2400" dirty="0">
+                <a:solidFill>
+                  <a:schemeClr val="bg1"/>
+                </a:solidFill>
+                <a:effectLst/>
+                <a:latin typeface="Calibri" panose="020F0502020204030204" pitchFamily="34" charset="0"/>
+              </a:rPr>
+              <a:t>Maintainability </a:t>
+            </a:r>
+          </a:p>
+          <a:p>
+            <a:pPr marL="457200" marR="0" indent="-457200">
+              <a:spcBef>
+                <a:spcPts val="0"/>
+              </a:spcBef>
+              <a:spcAft>
+                <a:spcPts val="0"/>
+              </a:spcAft>
+              <a:buFont typeface="+mj-lt"/>
+              <a:buAutoNum type="arabicPeriod"/>
+            </a:pPr>
+            <a:r>
+              <a:rPr lang="en-US" sz="2400" dirty="0">
+                <a:solidFill>
+                  <a:schemeClr val="bg1"/>
+                </a:solidFill>
+                <a:effectLst/>
+                <a:latin typeface="Calibri" panose="020F0502020204030204" pitchFamily="34" charset="0"/>
+              </a:rPr>
+              <a:t>Reliability</a:t>
+            </a:r>
+          </a:p>
+          <a:p>
+            <a:pPr marL="457200" marR="0" indent="-457200">
+              <a:spcBef>
+                <a:spcPts val="0"/>
+              </a:spcBef>
+              <a:spcAft>
+                <a:spcPts val="0"/>
+              </a:spcAft>
+              <a:buFont typeface="+mj-lt"/>
+              <a:buAutoNum type="arabicPeriod"/>
+            </a:pPr>
+            <a:r>
+              <a:rPr lang="en-US" sz="2400" dirty="0">
+                <a:solidFill>
+                  <a:schemeClr val="bg1"/>
+                </a:solidFill>
+                <a:effectLst/>
+                <a:latin typeface="Calibri" panose="020F0502020204030204" pitchFamily="34" charset="0"/>
+              </a:rPr>
+              <a:t>Compatibility </a:t>
+            </a:r>
+          </a:p>
+          <a:p>
+            <a:pPr marL="457200" marR="0" indent="-457200">
+              <a:spcBef>
+                <a:spcPts val="0"/>
+              </a:spcBef>
+              <a:spcAft>
+                <a:spcPts val="0"/>
+              </a:spcAft>
+              <a:buFont typeface="+mj-lt"/>
+              <a:buAutoNum type="arabicPeriod"/>
+            </a:pPr>
+            <a:r>
+              <a:rPr lang="en-US" sz="2400" dirty="0">
+                <a:solidFill>
+                  <a:schemeClr val="bg1"/>
+                </a:solidFill>
+                <a:effectLst/>
+                <a:latin typeface="Calibri" panose="020F0502020204030204" pitchFamily="34" charset="0"/>
+              </a:rPr>
+              <a:t>Security </a:t>
+            </a:r>
+          </a:p>
+          <a:p>
+            <a:pPr marL="457200" marR="0" indent="-457200">
+              <a:spcBef>
+                <a:spcPts val="0"/>
+              </a:spcBef>
+              <a:spcAft>
+                <a:spcPts val="0"/>
+              </a:spcAft>
+              <a:buFont typeface="+mj-lt"/>
+              <a:buAutoNum type="arabicPeriod"/>
+            </a:pPr>
+            <a:r>
+              <a:rPr lang="en-US" sz="2400" dirty="0">
+                <a:solidFill>
+                  <a:schemeClr val="bg1"/>
+                </a:solidFill>
+                <a:effectLst/>
+                <a:latin typeface="Calibri" panose="020F0502020204030204" pitchFamily="34" charset="0"/>
+              </a:rPr>
+              <a:t>Performance </a:t>
+            </a:r>
+          </a:p>
+          <a:p>
+            <a:pPr marL="457200" marR="0" indent="-457200">
+              <a:spcBef>
+                <a:spcPts val="0"/>
+              </a:spcBef>
+              <a:spcAft>
+                <a:spcPts val="0"/>
+              </a:spcAft>
+              <a:buFont typeface="+mj-lt"/>
+              <a:buAutoNum type="arabicPeriod"/>
+            </a:pPr>
+            <a:r>
+              <a:rPr lang="en-US" sz="2400" dirty="0">
+                <a:solidFill>
+                  <a:schemeClr val="bg1"/>
+                </a:solidFill>
+                <a:effectLst/>
+                <a:latin typeface="Calibri" panose="020F0502020204030204" pitchFamily="34" charset="0"/>
+              </a:rPr>
+              <a:t>Portability</a:t>
+            </a:r>
+          </a:p>
+        </p:txBody>
+      </p:sp>
     </p:spTree>
     <p:extLst>
       <p:ext uri="{BB962C8B-B14F-4D97-AF65-F5344CB8AC3E}">
-        <p14:creationId xmlns:p14="http://schemas.microsoft.com/office/powerpoint/2010/main" val="2532736438"/>
+        <p14:creationId xmlns:p14="http://schemas.microsoft.com/office/powerpoint/2010/main" val="2757931061"/>
       </p:ext>
     </p:extLst>
   </p:cSld>
@@ -9436,7 +9610,7 @@
           <p:cNvPr id="10" name="Picture 9">
             <a:extLst>
               <a:ext uri="{FF2B5EF4-FFF2-40B4-BE49-F238E27FC236}">
-                <a16:creationId xmlns:a16="http://schemas.microsoft.com/office/drawing/2014/main" id="{AA085689-791F-4B8F-9F30-12415B97D366}"/>
+                <a16:creationId xmlns:a16="http://schemas.microsoft.com/office/drawing/2014/main" id="{7594FC8B-8CD2-407F-94F1-9C71F5AEC2B6}"/>
               </a:ext>
               <a:ext uri="{C183D7F6-B498-43B3-948B-1728B52AA6E4}">
                 <adec:decorative xmlns:adec="http://schemas.microsoft.com/office/drawing/2017/decorative" val="1"/>
@@ -9480,7 +9654,7 @@
           <p:cNvPr id="12" name="Picture 11">
             <a:extLst>
               <a:ext uri="{FF2B5EF4-FFF2-40B4-BE49-F238E27FC236}">
-                <a16:creationId xmlns:a16="http://schemas.microsoft.com/office/drawing/2014/main" id="{AA3FED7F-6821-47C0-A464-E9278B24129E}"/>
+                <a16:creationId xmlns:a16="http://schemas.microsoft.com/office/drawing/2014/main" id="{DBABC971-8D40-4A4F-AC60-28B9172789B9}"/>
               </a:ext>
               <a:ext uri="{C183D7F6-B498-43B3-948B-1728B52AA6E4}">
                 <adec:decorative xmlns:adec="http://schemas.microsoft.com/office/drawing/2017/decorative" val="1"/>
@@ -9524,7 +9698,7 @@
           <p:cNvPr id="14" name="Oval 13">
             <a:extLst>
               <a:ext uri="{FF2B5EF4-FFF2-40B4-BE49-F238E27FC236}">
-                <a16:creationId xmlns:a16="http://schemas.microsoft.com/office/drawing/2014/main" id="{8F54B2FB-3F54-4350-8D1B-F86D677CA7ED}"/>
+                <a16:creationId xmlns:a16="http://schemas.microsoft.com/office/drawing/2014/main" id="{B9C04DC5-313B-4FE4-B868-5672A376419F}"/>
               </a:ext>
               <a:ext uri="{C183D7F6-B498-43B3-948B-1728B52AA6E4}">
                 <adec:decorative xmlns:adec="http://schemas.microsoft.com/office/drawing/2017/decorative" val="1"/>
@@ -9604,6 +9778,1116 @@
           <p:cNvPr id="16" name="Picture 15">
             <a:extLst>
               <a:ext uri="{FF2B5EF4-FFF2-40B4-BE49-F238E27FC236}">
+                <a16:creationId xmlns:a16="http://schemas.microsoft.com/office/drawing/2014/main" id="{791AE23E-90C9-4963-96E2-8DADBFC3BC09}"/>
+              </a:ext>
+              <a:ext uri="{C183D7F6-B498-43B3-948B-1728B52AA6E4}">
+                <adec:decorative xmlns:adec="http://schemas.microsoft.com/office/drawing/2017/decorative" val="1"/>
+              </a:ext>
+            </a:extLst>
+          </p:cNvPr>
+          <p:cNvPicPr>
+            <a:picLocks noGrp="1" noRot="1" noChangeAspect="1" noMove="1" noResize="1" noEditPoints="1" noAdjustHandles="1" noChangeArrowheads="1" noChangeShapeType="1" noCrop="1"/>
+          </p:cNvPicPr>
+          <p:nvPr>
+            <p:extLst>
+              <p:ext uri="{386F3935-93C4-4BCD-93E2-E3B085C9AB24}">
+                <p16:designElem xmlns:p16="http://schemas.microsoft.com/office/powerpoint/2015/main" val="1"/>
+              </p:ext>
+            </p:extLst>
+          </p:nvPr>
+        </p:nvPicPr>
+        <p:blipFill rotWithShape="1">
+          <a:blip r:embed="rId5">
+            <a:extLst>
+              <a:ext uri="{28A0092B-C50C-407E-A947-70E740481C1C}">
+                <a14:useLocalDpi xmlns:a14="http://schemas.microsoft.com/office/drawing/2010/main" val="0"/>
+              </a:ext>
+            </a:extLst>
+          </a:blip>
+          <a:srcRect t="28813"/>
+          <a:stretch/>
+        </p:blipFill>
+        <p:spPr>
+          <a:xfrm>
+            <a:off x="7999412" y="0"/>
+            <a:ext cx="1603387" cy="1141407"/>
+          </a:xfrm>
+          <a:prstGeom prst="rect">
+            <a:avLst/>
+          </a:prstGeom>
+        </p:spPr>
+      </p:pic>
+      <p:pic>
+        <p:nvPicPr>
+          <p:cNvPr id="18" name="Picture 17">
+            <a:extLst>
+              <a:ext uri="{FF2B5EF4-FFF2-40B4-BE49-F238E27FC236}">
+                <a16:creationId xmlns:a16="http://schemas.microsoft.com/office/drawing/2014/main" id="{C5F93E90-4379-4AAC-B021-E5FA6D974AED}"/>
+              </a:ext>
+              <a:ext uri="{C183D7F6-B498-43B3-948B-1728B52AA6E4}">
+                <adec:decorative xmlns:adec="http://schemas.microsoft.com/office/drawing/2017/decorative" val="1"/>
+              </a:ext>
+            </a:extLst>
+          </p:cNvPr>
+          <p:cNvPicPr>
+            <a:picLocks noGrp="1" noRot="1" noChangeAspect="1" noMove="1" noResize="1" noEditPoints="1" noAdjustHandles="1" noChangeArrowheads="1" noChangeShapeType="1" noCrop="1"/>
+          </p:cNvPicPr>
+          <p:nvPr>
+            <p:extLst>
+              <p:ext uri="{386F3935-93C4-4BCD-93E2-E3B085C9AB24}">
+                <p16:designElem xmlns:p16="http://schemas.microsoft.com/office/powerpoint/2015/main" val="1"/>
+              </p:ext>
+            </p:extLst>
+          </p:nvPr>
+        </p:nvPicPr>
+        <p:blipFill rotWithShape="1">
+          <a:blip r:embed="rId6">
+            <a:extLst>
+              <a:ext uri="{28A0092B-C50C-407E-A947-70E740481C1C}">
+                <a14:useLocalDpi xmlns:a14="http://schemas.microsoft.com/office/drawing/2010/main" val="0"/>
+              </a:ext>
+            </a:extLst>
+          </a:blip>
+          <a:srcRect b="23320"/>
+          <a:stretch/>
+        </p:blipFill>
+        <p:spPr>
+          <a:xfrm>
+            <a:off x="8609012" y="6096000"/>
+            <a:ext cx="993734" cy="762000"/>
+          </a:xfrm>
+          <a:prstGeom prst="rect">
+            <a:avLst/>
+          </a:prstGeom>
+        </p:spPr>
+      </p:pic>
+      <p:sp>
+        <p:nvSpPr>
+          <p:cNvPr id="20" name="Rectangle 19">
+            <a:extLst>
+              <a:ext uri="{FF2B5EF4-FFF2-40B4-BE49-F238E27FC236}">
+                <a16:creationId xmlns:a16="http://schemas.microsoft.com/office/drawing/2014/main" id="{329FDD08-42D8-4AFF-90E5-5DAA5BC4CBD8}"/>
+              </a:ext>
+              <a:ext uri="{C183D7F6-B498-43B3-948B-1728B52AA6E4}">
+                <adec:decorative xmlns:adec="http://schemas.microsoft.com/office/drawing/2017/decorative" val="1"/>
+              </a:ext>
+            </a:extLst>
+          </p:cNvPr>
+          <p:cNvSpPr>
+            <a:spLocks noGrp="1" noRot="1" noChangeAspect="1" noMove="1" noResize="1" noEditPoints="1" noAdjustHandles="1" noChangeArrowheads="1" noChangeShapeType="1" noTextEdit="1"/>
+          </p:cNvSpPr>
+          <p:nvPr>
+            <p:extLst>
+              <p:ext uri="{386F3935-93C4-4BCD-93E2-E3B085C9AB24}">
+                <p16:designElem xmlns:p16="http://schemas.microsoft.com/office/powerpoint/2015/main" val="1"/>
+              </p:ext>
+            </p:extLst>
+          </p:nvPr>
+        </p:nvSpPr>
+        <p:spPr>
+          <a:xfrm>
+            <a:off x="10437812" y="0"/>
+            <a:ext cx="685800" cy="1143000"/>
+          </a:xfrm>
+          <a:prstGeom prst="rect">
+            <a:avLst/>
+          </a:prstGeom>
+          <a:solidFill>
+            <a:schemeClr val="accent1"/>
+          </a:solidFill>
+          <a:ln>
+            <a:noFill/>
+          </a:ln>
+        </p:spPr>
+        <p:style>
+          <a:lnRef idx="1">
+            <a:schemeClr val="accent1"/>
+          </a:lnRef>
+          <a:fillRef idx="3">
+            <a:schemeClr val="accent1"/>
+          </a:fillRef>
+          <a:effectRef idx="2">
+            <a:schemeClr val="accent1"/>
+          </a:effectRef>
+          <a:fontRef idx="minor">
+            <a:schemeClr val="lt1"/>
+          </a:fontRef>
+        </p:style>
+      </p:sp>
+      <p:sp>
+        <p:nvSpPr>
+          <p:cNvPr id="22" name="Rectangle 21">
+            <a:extLst>
+              <a:ext uri="{FF2B5EF4-FFF2-40B4-BE49-F238E27FC236}">
+                <a16:creationId xmlns:a16="http://schemas.microsoft.com/office/drawing/2014/main" id="{B87A2B17-D3E0-4B38-823F-45312C0B36E7}"/>
+              </a:ext>
+              <a:ext uri="{C183D7F6-B498-43B3-948B-1728B52AA6E4}">
+                <adec:decorative xmlns:adec="http://schemas.microsoft.com/office/drawing/2017/decorative" val="1"/>
+              </a:ext>
+            </a:extLst>
+          </p:cNvPr>
+          <p:cNvSpPr>
+            <a:spLocks noGrp="1" noRot="1" noChangeAspect="1" noMove="1" noResize="1" noEditPoints="1" noAdjustHandles="1" noChangeArrowheads="1" noChangeShapeType="1" noTextEdit="1"/>
+          </p:cNvSpPr>
+          <p:nvPr>
+            <p:extLst>
+              <p:ext uri="{386F3935-93C4-4BCD-93E2-E3B085C9AB24}">
+                <p16:designElem xmlns:p16="http://schemas.microsoft.com/office/powerpoint/2015/main" val="1"/>
+              </p:ext>
+            </p:extLst>
+          </p:nvPr>
+        </p:nvSpPr>
+        <p:spPr>
+          <a:xfrm>
+            <a:off x="0" y="-5"/>
+            <a:ext cx="12191695" cy="4730744"/>
+          </a:xfrm>
+          <a:prstGeom prst="rect">
+            <a:avLst/>
+          </a:prstGeom>
+          <a:solidFill>
+            <a:srgbClr val="FFFFFF"/>
+          </a:solidFill>
+          <a:ln>
+            <a:noFill/>
+          </a:ln>
+        </p:spPr>
+        <p:style>
+          <a:lnRef idx="2">
+            <a:schemeClr val="accent1">
+              <a:shade val="50000"/>
+            </a:schemeClr>
+          </a:lnRef>
+          <a:fillRef idx="1">
+            <a:schemeClr val="accent1"/>
+          </a:fillRef>
+          <a:effectRef idx="0">
+            <a:schemeClr val="accent1"/>
+          </a:effectRef>
+          <a:fontRef idx="minor">
+            <a:schemeClr val="lt1"/>
+          </a:fontRef>
+        </p:style>
+        <p:txBody>
+          <a:bodyPr rtlCol="0" anchor="ctr"/>
+          <a:lstStyle/>
+          <a:p>
+            <a:pPr algn="ctr"/>
+            <a:endParaRPr lang="en-US"/>
+          </a:p>
+        </p:txBody>
+      </p:sp>
+      <p:sp>
+        <p:nvSpPr>
+          <p:cNvPr id="24" name="Rectangle 23">
+            <a:extLst>
+              <a:ext uri="{FF2B5EF4-FFF2-40B4-BE49-F238E27FC236}">
+                <a16:creationId xmlns:a16="http://schemas.microsoft.com/office/drawing/2014/main" id="{8592A21B-8E82-4396-A130-C7531DF0A97E}"/>
+              </a:ext>
+              <a:ext uri="{C183D7F6-B498-43B3-948B-1728B52AA6E4}">
+                <adec:decorative xmlns:adec="http://schemas.microsoft.com/office/drawing/2017/decorative" val="1"/>
+              </a:ext>
+            </a:extLst>
+          </p:cNvPr>
+          <p:cNvSpPr>
+            <a:spLocks noGrp="1" noRot="1" noChangeAspect="1" noMove="1" noResize="1" noEditPoints="1" noAdjustHandles="1" noChangeArrowheads="1" noChangeShapeType="1" noTextEdit="1"/>
+          </p:cNvSpPr>
+          <p:nvPr>
+            <p:extLst>
+              <p:ext uri="{386F3935-93C4-4BCD-93E2-E3B085C9AB24}">
+                <p16:designElem xmlns:p16="http://schemas.microsoft.com/office/powerpoint/2015/main" val="1"/>
+              </p:ext>
+            </p:extLst>
+          </p:nvPr>
+        </p:nvSpPr>
+        <p:spPr>
+          <a:xfrm>
+            <a:off x="10437812" y="0"/>
+            <a:ext cx="685800" cy="1143000"/>
+          </a:xfrm>
+          <a:prstGeom prst="rect">
+            <a:avLst/>
+          </a:prstGeom>
+          <a:solidFill>
+            <a:schemeClr val="accent1"/>
+          </a:solidFill>
+          <a:ln>
+            <a:noFill/>
+          </a:ln>
+        </p:spPr>
+        <p:style>
+          <a:lnRef idx="1">
+            <a:schemeClr val="accent1"/>
+          </a:lnRef>
+          <a:fillRef idx="3">
+            <a:schemeClr val="accent1"/>
+          </a:fillRef>
+          <a:effectRef idx="2">
+            <a:schemeClr val="accent1"/>
+          </a:effectRef>
+          <a:fontRef idx="minor">
+            <a:schemeClr val="lt1"/>
+          </a:fontRef>
+        </p:style>
+      </p:sp>
+      <p:sp>
+        <p:nvSpPr>
+          <p:cNvPr id="26" name="Freeform 16">
+            <a:extLst>
+              <a:ext uri="{FF2B5EF4-FFF2-40B4-BE49-F238E27FC236}">
+                <a16:creationId xmlns:a16="http://schemas.microsoft.com/office/drawing/2014/main" id="{ACA9027C-9377-4A86-A639-42BA502ADE1C}"/>
+              </a:ext>
+              <a:ext uri="{C183D7F6-B498-43B3-948B-1728B52AA6E4}">
+                <adec:decorative xmlns:adec="http://schemas.microsoft.com/office/drawing/2017/decorative" val="1"/>
+              </a:ext>
+            </a:extLst>
+          </p:cNvPr>
+          <p:cNvSpPr>
+            <a:spLocks noGrp="1" noRot="1" noChangeAspect="1" noMove="1" noResize="1" noEditPoints="1" noAdjustHandles="1" noChangeArrowheads="1" noChangeShapeType="1" noTextEdit="1"/>
+          </p:cNvSpPr>
+          <p:nvPr>
+            <p:extLst>
+              <p:ext uri="{386F3935-93C4-4BCD-93E2-E3B085C9AB24}">
+                <p16:designElem xmlns:p16="http://schemas.microsoft.com/office/powerpoint/2015/main" val="1"/>
+              </p:ext>
+            </p:extLst>
+          </p:nvPr>
+        </p:nvSpPr>
+        <p:spPr>
+          <a:xfrm>
+            <a:off x="8719939" y="3753695"/>
+            <a:ext cx="3472060" cy="825932"/>
+          </a:xfrm>
+          <a:custGeom>
+            <a:avLst/>
+            <a:gdLst>
+              <a:gd name="connsiteX0" fmla="*/ 3470310 w 3472060"/>
+              <a:gd name="connsiteY0" fmla="*/ 0 h 825932"/>
+              <a:gd name="connsiteX1" fmla="*/ 3472060 w 3472060"/>
+              <a:gd name="connsiteY1" fmla="*/ 12850 h 825932"/>
+              <a:gd name="connsiteX2" fmla="*/ 3472060 w 3472060"/>
+              <a:gd name="connsiteY2" fmla="*/ 480529 h 825932"/>
+              <a:gd name="connsiteX3" fmla="*/ 3363699 w 3472060"/>
+              <a:gd name="connsiteY3" fmla="*/ 498471 h 825932"/>
+              <a:gd name="connsiteX4" fmla="*/ 42060 w 3472060"/>
+              <a:gd name="connsiteY4" fmla="*/ 824486 h 825932"/>
+              <a:gd name="connsiteX5" fmla="*/ 0 w 3472060"/>
+              <a:gd name="connsiteY5" fmla="*/ 758452 h 825932"/>
+              <a:gd name="connsiteX6" fmla="*/ 188014 w 3472060"/>
+              <a:gd name="connsiteY6" fmla="*/ 735602 h 825932"/>
+              <a:gd name="connsiteX7" fmla="*/ 284087 w 3472060"/>
+              <a:gd name="connsiteY7" fmla="*/ 722590 h 825932"/>
+              <a:gd name="connsiteX8" fmla="*/ 382288 w 3472060"/>
+              <a:gd name="connsiteY8" fmla="*/ 709392 h 825932"/>
+              <a:gd name="connsiteX9" fmla="*/ 481858 w 3472060"/>
+              <a:gd name="connsiteY9" fmla="*/ 695774 h 825932"/>
+              <a:gd name="connsiteX10" fmla="*/ 581897 w 3472060"/>
+              <a:gd name="connsiteY10" fmla="*/ 680711 h 825932"/>
+              <a:gd name="connsiteX11" fmla="*/ 683670 w 3472060"/>
+              <a:gd name="connsiteY11" fmla="*/ 665256 h 825932"/>
+              <a:gd name="connsiteX12" fmla="*/ 787206 w 3472060"/>
+              <a:gd name="connsiteY12" fmla="*/ 649587 h 825932"/>
+              <a:gd name="connsiteX13" fmla="*/ 892019 w 3472060"/>
+              <a:gd name="connsiteY13" fmla="*/ 632968 h 825932"/>
+              <a:gd name="connsiteX14" fmla="*/ 997620 w 3472060"/>
+              <a:gd name="connsiteY14" fmla="*/ 614667 h 825932"/>
+              <a:gd name="connsiteX15" fmla="*/ 1104727 w 3472060"/>
+              <a:gd name="connsiteY15" fmla="*/ 596741 h 825932"/>
+              <a:gd name="connsiteX16" fmla="*/ 1212669 w 3472060"/>
+              <a:gd name="connsiteY16" fmla="*/ 577397 h 825932"/>
+              <a:gd name="connsiteX17" fmla="*/ 1321506 w 3472060"/>
+              <a:gd name="connsiteY17" fmla="*/ 556988 h 825932"/>
+              <a:gd name="connsiteX18" fmla="*/ 1430709 w 3472060"/>
+              <a:gd name="connsiteY18" fmla="*/ 536607 h 825932"/>
+              <a:gd name="connsiteX19" fmla="*/ 1541050 w 3472060"/>
+              <a:gd name="connsiteY19" fmla="*/ 514481 h 825932"/>
+              <a:gd name="connsiteX20" fmla="*/ 1652805 w 3472060"/>
+              <a:gd name="connsiteY20" fmla="*/ 492202 h 825932"/>
+              <a:gd name="connsiteX21" fmla="*/ 1763708 w 3472060"/>
+              <a:gd name="connsiteY21" fmla="*/ 469161 h 825932"/>
+              <a:gd name="connsiteX22" fmla="*/ 1875795 w 3472060"/>
+              <a:gd name="connsiteY22" fmla="*/ 444641 h 825932"/>
+              <a:gd name="connsiteX23" fmla="*/ 1989128 w 3472060"/>
+              <a:gd name="connsiteY23" fmla="*/ 418995 h 825932"/>
+              <a:gd name="connsiteX24" fmla="*/ 2102476 w 3472060"/>
+              <a:gd name="connsiteY24" fmla="*/ 393438 h 825932"/>
+              <a:gd name="connsiteX25" fmla="*/ 2215549 w 3472060"/>
+              <a:gd name="connsiteY25" fmla="*/ 366291 h 825932"/>
+              <a:gd name="connsiteX26" fmla="*/ 2330490 w 3472060"/>
+              <a:gd name="connsiteY26" fmla="*/ 337455 h 825932"/>
+              <a:gd name="connsiteX27" fmla="*/ 2443333 w 3472060"/>
+              <a:gd name="connsiteY27" fmla="*/ 308983 h 825932"/>
+              <a:gd name="connsiteX28" fmla="*/ 2558014 w 3472060"/>
+              <a:gd name="connsiteY28" fmla="*/ 278646 h 825932"/>
+              <a:gd name="connsiteX29" fmla="*/ 2673621 w 3472060"/>
+              <a:gd name="connsiteY29" fmla="*/ 247421 h 825932"/>
+              <a:gd name="connsiteX30" fmla="*/ 2787008 w 3472060"/>
+              <a:gd name="connsiteY30" fmla="*/ 215853 h 825932"/>
+              <a:gd name="connsiteX31" fmla="*/ 2901442 w 3472060"/>
+              <a:gd name="connsiteY31" fmla="*/ 182011 h 825932"/>
+              <a:gd name="connsiteX32" fmla="*/ 3015722 w 3472060"/>
+              <a:gd name="connsiteY32" fmla="*/ 147286 h 825932"/>
+              <a:gd name="connsiteX33" fmla="*/ 3130018 w 3472060"/>
+              <a:gd name="connsiteY33" fmla="*/ 112649 h 825932"/>
+              <a:gd name="connsiteX34" fmla="*/ 3243551 w 3472060"/>
+              <a:gd name="connsiteY34" fmla="*/ 75688 h 825932"/>
+              <a:gd name="connsiteX35" fmla="*/ 3356992 w 3472060"/>
+              <a:gd name="connsiteY35" fmla="*/ 38197 h 825932"/>
+              <a:gd name="connsiteX36" fmla="*/ 3470310 w 3472060"/>
+              <a:gd name="connsiteY36" fmla="*/ 0 h 825932"/>
+            </a:gdLst>
+            <a:ahLst/>
+            <a:cxnLst>
+              <a:cxn ang="0">
+                <a:pos x="connsiteX0" y="connsiteY0"/>
+              </a:cxn>
+              <a:cxn ang="0">
+                <a:pos x="connsiteX1" y="connsiteY1"/>
+              </a:cxn>
+              <a:cxn ang="0">
+                <a:pos x="connsiteX2" y="connsiteY2"/>
+              </a:cxn>
+              <a:cxn ang="0">
+                <a:pos x="connsiteX3" y="connsiteY3"/>
+              </a:cxn>
+              <a:cxn ang="0">
+                <a:pos x="connsiteX4" y="connsiteY4"/>
+              </a:cxn>
+              <a:cxn ang="0">
+                <a:pos x="connsiteX5" y="connsiteY5"/>
+              </a:cxn>
+              <a:cxn ang="0">
+                <a:pos x="connsiteX6" y="connsiteY6"/>
+              </a:cxn>
+              <a:cxn ang="0">
+                <a:pos x="connsiteX7" y="connsiteY7"/>
+              </a:cxn>
+              <a:cxn ang="0">
+                <a:pos x="connsiteX8" y="connsiteY8"/>
+              </a:cxn>
+              <a:cxn ang="0">
+                <a:pos x="connsiteX9" y="connsiteY9"/>
+              </a:cxn>
+              <a:cxn ang="0">
+                <a:pos x="connsiteX10" y="connsiteY10"/>
+              </a:cxn>
+              <a:cxn ang="0">
+                <a:pos x="connsiteX11" y="connsiteY11"/>
+              </a:cxn>
+              <a:cxn ang="0">
+                <a:pos x="connsiteX12" y="connsiteY12"/>
+              </a:cxn>
+              <a:cxn ang="0">
+                <a:pos x="connsiteX13" y="connsiteY13"/>
+              </a:cxn>
+              <a:cxn ang="0">
+                <a:pos x="connsiteX14" y="connsiteY14"/>
+              </a:cxn>
+              <a:cxn ang="0">
+                <a:pos x="connsiteX15" y="connsiteY15"/>
+              </a:cxn>
+              <a:cxn ang="0">
+                <a:pos x="connsiteX16" y="connsiteY16"/>
+              </a:cxn>
+              <a:cxn ang="0">
+                <a:pos x="connsiteX17" y="connsiteY17"/>
+              </a:cxn>
+              <a:cxn ang="0">
+                <a:pos x="connsiteX18" y="connsiteY18"/>
+              </a:cxn>
+              <a:cxn ang="0">
+                <a:pos x="connsiteX19" y="connsiteY19"/>
+              </a:cxn>
+              <a:cxn ang="0">
+                <a:pos x="connsiteX20" y="connsiteY20"/>
+              </a:cxn>
+              <a:cxn ang="0">
+                <a:pos x="connsiteX21" y="connsiteY21"/>
+              </a:cxn>
+              <a:cxn ang="0">
+                <a:pos x="connsiteX22" y="connsiteY22"/>
+              </a:cxn>
+              <a:cxn ang="0">
+                <a:pos x="connsiteX23" y="connsiteY23"/>
+              </a:cxn>
+              <a:cxn ang="0">
+                <a:pos x="connsiteX24" y="connsiteY24"/>
+              </a:cxn>
+              <a:cxn ang="0">
+                <a:pos x="connsiteX25" y="connsiteY25"/>
+              </a:cxn>
+              <a:cxn ang="0">
+                <a:pos x="connsiteX26" y="connsiteY26"/>
+              </a:cxn>
+              <a:cxn ang="0">
+                <a:pos x="connsiteX27" y="connsiteY27"/>
+              </a:cxn>
+              <a:cxn ang="0">
+                <a:pos x="connsiteX28" y="connsiteY28"/>
+              </a:cxn>
+              <a:cxn ang="0">
+                <a:pos x="connsiteX29" y="connsiteY29"/>
+              </a:cxn>
+              <a:cxn ang="0">
+                <a:pos x="connsiteX30" y="connsiteY30"/>
+              </a:cxn>
+              <a:cxn ang="0">
+                <a:pos x="connsiteX31" y="connsiteY31"/>
+              </a:cxn>
+              <a:cxn ang="0">
+                <a:pos x="connsiteX32" y="connsiteY32"/>
+              </a:cxn>
+              <a:cxn ang="0">
+                <a:pos x="connsiteX33" y="connsiteY33"/>
+              </a:cxn>
+              <a:cxn ang="0">
+                <a:pos x="connsiteX34" y="connsiteY34"/>
+              </a:cxn>
+              <a:cxn ang="0">
+                <a:pos x="connsiteX35" y="connsiteY35"/>
+              </a:cxn>
+              <a:cxn ang="0">
+                <a:pos x="connsiteX36" y="connsiteY36"/>
+              </a:cxn>
+            </a:cxnLst>
+            <a:rect l="l" t="t" r="r" b="b"/>
+            <a:pathLst>
+              <a:path w="3472060" h="825932">
+                <a:moveTo>
+                  <a:pt x="3470310" y="0"/>
+                </a:moveTo>
+                <a:lnTo>
+                  <a:pt x="3472060" y="12850"/>
+                </a:lnTo>
+                <a:lnTo>
+                  <a:pt x="3472060" y="480529"/>
+                </a:lnTo>
+                <a:lnTo>
+                  <a:pt x="3363699" y="498471"/>
+                </a:lnTo>
+                <a:cubicBezTo>
+                  <a:pt x="2435623" y="645518"/>
+                  <a:pt x="603076" y="844866"/>
+                  <a:pt x="42060" y="824486"/>
+                </a:cubicBezTo>
+                <a:cubicBezTo>
+                  <a:pt x="28151" y="802425"/>
+                  <a:pt x="13909" y="780513"/>
+                  <a:pt x="0" y="758452"/>
+                </a:cubicBezTo>
+                <a:lnTo>
+                  <a:pt x="188014" y="735602"/>
+                </a:lnTo>
+                <a:lnTo>
+                  <a:pt x="284087" y="722590"/>
+                </a:lnTo>
+                <a:lnTo>
+                  <a:pt x="382288" y="709392"/>
+                </a:lnTo>
+                <a:lnTo>
+                  <a:pt x="481858" y="695774"/>
+                </a:lnTo>
+                <a:lnTo>
+                  <a:pt x="581897" y="680711"/>
+                </a:lnTo>
+                <a:lnTo>
+                  <a:pt x="683670" y="665256"/>
+                </a:lnTo>
+                <a:lnTo>
+                  <a:pt x="787206" y="649587"/>
+                </a:lnTo>
+                <a:lnTo>
+                  <a:pt x="892019" y="632968"/>
+                </a:lnTo>
+                <a:lnTo>
+                  <a:pt x="997620" y="614667"/>
+                </a:lnTo>
+                <a:lnTo>
+                  <a:pt x="1104727" y="596741"/>
+                </a:lnTo>
+                <a:lnTo>
+                  <a:pt x="1212669" y="577397"/>
+                </a:lnTo>
+                <a:lnTo>
+                  <a:pt x="1321506" y="556988"/>
+                </a:lnTo>
+                <a:lnTo>
+                  <a:pt x="1430709" y="536607"/>
+                </a:lnTo>
+                <a:lnTo>
+                  <a:pt x="1541050" y="514481"/>
+                </a:lnTo>
+                <a:lnTo>
+                  <a:pt x="1652805" y="492202"/>
+                </a:lnTo>
+                <a:lnTo>
+                  <a:pt x="1763708" y="469161"/>
+                </a:lnTo>
+                <a:lnTo>
+                  <a:pt x="1875795" y="444641"/>
+                </a:lnTo>
+                <a:lnTo>
+                  <a:pt x="1989128" y="418995"/>
+                </a:lnTo>
+                <a:lnTo>
+                  <a:pt x="2102476" y="393438"/>
+                </a:lnTo>
+                <a:lnTo>
+                  <a:pt x="2215549" y="366291"/>
+                </a:lnTo>
+                <a:lnTo>
+                  <a:pt x="2330490" y="337455"/>
+                </a:lnTo>
+                <a:lnTo>
+                  <a:pt x="2443333" y="308983"/>
+                </a:lnTo>
+                <a:lnTo>
+                  <a:pt x="2558014" y="278646"/>
+                </a:lnTo>
+                <a:lnTo>
+                  <a:pt x="2673621" y="247421"/>
+                </a:lnTo>
+                <a:lnTo>
+                  <a:pt x="2787008" y="215853"/>
+                </a:lnTo>
+                <a:lnTo>
+                  <a:pt x="2901442" y="182011"/>
+                </a:lnTo>
+                <a:lnTo>
+                  <a:pt x="3015722" y="147286"/>
+                </a:lnTo>
+                <a:lnTo>
+                  <a:pt x="3130018" y="112649"/>
+                </a:lnTo>
+                <a:lnTo>
+                  <a:pt x="3243551" y="75688"/>
+                </a:lnTo>
+                <a:lnTo>
+                  <a:pt x="3356992" y="38197"/>
+                </a:lnTo>
+                <a:lnTo>
+                  <a:pt x="3470310" y="0"/>
+                </a:lnTo>
+                <a:close/>
+              </a:path>
+            </a:pathLst>
+          </a:custGeom>
+          <a:solidFill>
+            <a:schemeClr val="bg2">
+              <a:alpha val="20000"/>
+            </a:schemeClr>
+          </a:solidFill>
+          <a:ln>
+            <a:noFill/>
+          </a:ln>
+        </p:spPr>
+        <p:txBody>
+          <a:bodyPr rtlCol="0" anchor="ctr"/>
+          <a:lstStyle/>
+          <a:p>
+            <a:pPr algn="ctr"/>
+            <a:endParaRPr lang="en-US">
+              <a:solidFill>
+                <a:schemeClr val="tx1"/>
+              </a:solidFill>
+            </a:endParaRPr>
+          </a:p>
+        </p:txBody>
+      </p:sp>
+      <p:sp useBgFill="1">
+        <p:nvSpPr>
+          <p:cNvPr id="28" name="Freeform 5">
+            <a:extLst>
+              <a:ext uri="{FF2B5EF4-FFF2-40B4-BE49-F238E27FC236}">
+                <a16:creationId xmlns:a16="http://schemas.microsoft.com/office/drawing/2014/main" id="{423EDA5B-B414-4C7C-8CBA-3D9D79973ED0}"/>
+              </a:ext>
+              <a:ext uri="{C183D7F6-B498-43B3-948B-1728B52AA6E4}">
+                <adec:decorative xmlns:adec="http://schemas.microsoft.com/office/drawing/2017/decorative" val="1"/>
+              </a:ext>
+            </a:extLst>
+          </p:cNvPr>
+          <p:cNvSpPr>
+            <a:spLocks noGrp="1" noRot="1" noChangeAspect="1" noMove="1" noResize="1" noEditPoints="1" noAdjustHandles="1" noChangeArrowheads="1" noChangeShapeType="1" noTextEdit="1"/>
+          </p:cNvSpPr>
+          <p:nvPr>
+            <p:extLst>
+              <p:ext uri="{386F3935-93C4-4BCD-93E2-E3B085C9AB24}">
+                <p16:designElem xmlns:p16="http://schemas.microsoft.com/office/powerpoint/2015/main" val="1"/>
+              </p:ext>
+            </p:extLst>
+          </p:nvPr>
+        </p:nvSpPr>
+        <p:spPr bwMode="gray">
+          <a:xfrm>
+            <a:off x="1" y="4055532"/>
+            <a:ext cx="12191695" cy="2802467"/>
+          </a:xfrm>
+          <a:custGeom>
+            <a:avLst/>
+            <a:gdLst/>
+            <a:ahLst/>
+            <a:cxnLst/>
+            <a:rect l="l" t="t" r="r" b="b"/>
+            <a:pathLst>
+              <a:path w="10000" h="8000">
+                <a:moveTo>
+                  <a:pt x="0" y="0"/>
+                </a:moveTo>
+                <a:lnTo>
+                  <a:pt x="0" y="7970"/>
+                </a:lnTo>
+                <a:lnTo>
+                  <a:pt x="10000" y="8000"/>
+                </a:lnTo>
+                <a:lnTo>
+                  <a:pt x="10000" y="7"/>
+                </a:lnTo>
+                <a:lnTo>
+                  <a:pt x="10000" y="7"/>
+                </a:lnTo>
+                <a:lnTo>
+                  <a:pt x="9773" y="156"/>
+                </a:lnTo>
+                <a:lnTo>
+                  <a:pt x="9547" y="298"/>
+                </a:lnTo>
+                <a:lnTo>
+                  <a:pt x="9320" y="437"/>
+                </a:lnTo>
+                <a:lnTo>
+                  <a:pt x="9092" y="556"/>
+                </a:lnTo>
+                <a:lnTo>
+                  <a:pt x="8865" y="676"/>
+                </a:lnTo>
+                <a:lnTo>
+                  <a:pt x="8637" y="788"/>
+                </a:lnTo>
+                <a:lnTo>
+                  <a:pt x="8412" y="884"/>
+                </a:lnTo>
+                <a:lnTo>
+                  <a:pt x="8184" y="975"/>
+                </a:lnTo>
+                <a:lnTo>
+                  <a:pt x="7957" y="1058"/>
+                </a:lnTo>
+                <a:lnTo>
+                  <a:pt x="7734" y="1130"/>
+                </a:lnTo>
+                <a:lnTo>
+                  <a:pt x="7508" y="1202"/>
+                </a:lnTo>
+                <a:lnTo>
+                  <a:pt x="7285" y="1262"/>
+                </a:lnTo>
+                <a:lnTo>
+                  <a:pt x="7062" y="1309"/>
+                </a:lnTo>
+                <a:lnTo>
+                  <a:pt x="6840" y="1358"/>
+                </a:lnTo>
+                <a:lnTo>
+                  <a:pt x="6620" y="1399"/>
+                </a:lnTo>
+                <a:lnTo>
+                  <a:pt x="6402" y="1428"/>
+                </a:lnTo>
+                <a:lnTo>
+                  <a:pt x="6184" y="1453"/>
+                </a:lnTo>
+                <a:lnTo>
+                  <a:pt x="5968" y="1477"/>
+                </a:lnTo>
+                <a:lnTo>
+                  <a:pt x="5755" y="1488"/>
+                </a:lnTo>
+                <a:lnTo>
+                  <a:pt x="5542" y="1500"/>
+                </a:lnTo>
+                <a:lnTo>
+                  <a:pt x="5332" y="1506"/>
+                </a:lnTo>
+                <a:lnTo>
+                  <a:pt x="5124" y="1500"/>
+                </a:lnTo>
+                <a:lnTo>
+                  <a:pt x="4918" y="1500"/>
+                </a:lnTo>
+                <a:lnTo>
+                  <a:pt x="4714" y="1488"/>
+                </a:lnTo>
+                <a:lnTo>
+                  <a:pt x="4514" y="1470"/>
+                </a:lnTo>
+                <a:lnTo>
+                  <a:pt x="4316" y="1453"/>
+                </a:lnTo>
+                <a:lnTo>
+                  <a:pt x="4122" y="1434"/>
+                </a:lnTo>
+                <a:lnTo>
+                  <a:pt x="3929" y="1405"/>
+                </a:lnTo>
+                <a:lnTo>
+                  <a:pt x="3739" y="1374"/>
+                </a:lnTo>
+                <a:lnTo>
+                  <a:pt x="3553" y="1346"/>
+                </a:lnTo>
+                <a:lnTo>
+                  <a:pt x="3190" y="1267"/>
+                </a:lnTo>
+                <a:lnTo>
+                  <a:pt x="2842" y="1183"/>
+                </a:lnTo>
+                <a:lnTo>
+                  <a:pt x="2508" y="1095"/>
+                </a:lnTo>
+                <a:lnTo>
+                  <a:pt x="2192" y="998"/>
+                </a:lnTo>
+                <a:lnTo>
+                  <a:pt x="1890" y="897"/>
+                </a:lnTo>
+                <a:lnTo>
+                  <a:pt x="1610" y="788"/>
+                </a:lnTo>
+                <a:lnTo>
+                  <a:pt x="1347" y="681"/>
+                </a:lnTo>
+                <a:lnTo>
+                  <a:pt x="1105" y="574"/>
+                </a:lnTo>
+                <a:lnTo>
+                  <a:pt x="883" y="473"/>
+                </a:lnTo>
+                <a:lnTo>
+                  <a:pt x="686" y="377"/>
+                </a:lnTo>
+                <a:lnTo>
+                  <a:pt x="508" y="286"/>
+                </a:lnTo>
+                <a:lnTo>
+                  <a:pt x="358" y="210"/>
+                </a:lnTo>
+                <a:lnTo>
+                  <a:pt x="232" y="138"/>
+                </a:lnTo>
+                <a:lnTo>
+                  <a:pt x="59" y="35"/>
+                </a:lnTo>
+                <a:lnTo>
+                  <a:pt x="0" y="0"/>
+                </a:lnTo>
+                <a:lnTo>
+                  <a:pt x="0" y="0"/>
+                </a:lnTo>
+                <a:close/>
+              </a:path>
+            </a:pathLst>
+          </a:custGeom>
+          <a:ln>
+            <a:noFill/>
+          </a:ln>
+        </p:spPr>
+      </p:sp>
+      <p:sp>
+        <p:nvSpPr>
+          <p:cNvPr id="2" name="Title 1">
+            <a:extLst>
+              <a:ext uri="{FF2B5EF4-FFF2-40B4-BE49-F238E27FC236}">
+                <a16:creationId xmlns:a16="http://schemas.microsoft.com/office/drawing/2014/main" id="{E8169612-1525-F042-8ECC-ABD60A96851A}"/>
+              </a:ext>
+            </a:extLst>
+          </p:cNvPr>
+          <p:cNvSpPr>
+            <a:spLocks noGrp="1"/>
+          </p:cNvSpPr>
+          <p:nvPr>
+            <p:ph type="title"/>
+          </p:nvPr>
+        </p:nvSpPr>
+        <p:spPr>
+          <a:xfrm>
+            <a:off x="636916" y="4993035"/>
+            <a:ext cx="9149350" cy="868026"/>
+          </a:xfrm>
+        </p:spPr>
+        <p:txBody>
+          <a:bodyPr vert="horz" lIns="91440" tIns="45720" rIns="91440" bIns="45720" rtlCol="0" anchor="b">
+            <a:normAutofit/>
+          </a:bodyPr>
+          <a:lstStyle/>
+          <a:p>
+            <a:r>
+              <a:rPr lang="en-US" sz="4800" dirty="0" err="1"/>
+              <a:t>Qualitätsstandardmatrix</a:t>
+            </a:r>
+            <a:endParaRPr lang="en-US" sz="4800" dirty="0"/>
+          </a:p>
+        </p:txBody>
+      </p:sp>
+      <p:pic>
+        <p:nvPicPr>
+          <p:cNvPr id="5" name="Content Placeholder 4" descr="A picture containing white&#10;&#10;Description automatically generated">
+            <a:extLst>
+              <a:ext uri="{FF2B5EF4-FFF2-40B4-BE49-F238E27FC236}">
+                <a16:creationId xmlns:a16="http://schemas.microsoft.com/office/drawing/2014/main" id="{D6BE296C-4299-B047-99F6-EE7C77EEA6E5}"/>
+              </a:ext>
+            </a:extLst>
+          </p:cNvPr>
+          <p:cNvPicPr>
+            <a:picLocks noGrp="1" noChangeAspect="1"/>
+          </p:cNvPicPr>
+          <p:nvPr>
+            <p:ph idx="1"/>
+          </p:nvPr>
+        </p:nvPicPr>
+        <p:blipFill>
+          <a:blip r:embed="rId7"/>
+          <a:stretch>
+            <a:fillRect/>
+          </a:stretch>
+        </p:blipFill>
+        <p:spPr>
+          <a:xfrm>
+            <a:off x="398501" y="334700"/>
+            <a:ext cx="10030215" cy="3084290"/>
+          </a:xfrm>
+          <a:prstGeom prst="rect">
+            <a:avLst/>
+          </a:prstGeom>
+          <a:effectLst/>
+        </p:spPr>
+      </p:pic>
+    </p:spTree>
+    <p:extLst>
+      <p:ext uri="{BB962C8B-B14F-4D97-AF65-F5344CB8AC3E}">
+        <p14:creationId xmlns:p14="http://schemas.microsoft.com/office/powerpoint/2010/main" val="2532736438"/>
+      </p:ext>
+    </p:extLst>
+  </p:cSld>
+  <p:clrMapOvr>
+    <a:masterClrMapping/>
+  </p:clrMapOvr>
+</p:sld>
+</file>
+
+<file path=ppt/slides/slide8.xml><?xml version="1.0" encoding="utf-8"?>
+<p:sld xmlns:a="http://schemas.openxmlformats.org/drawingml/2006/main" xmlns:r="http://schemas.openxmlformats.org/officeDocument/2006/relationships" xmlns:p="http://schemas.openxmlformats.org/presentationml/2006/main">
+  <p:cSld>
+    <p:bg>
+      <p:bgPr>
+        <a:blipFill rotWithShape="1">
+          <a:blip r:embed="rId2">
+            <a:duotone>
+              <a:schemeClr val="bg2">
+                <a:shade val="62000"/>
+                <a:hueMod val="108000"/>
+                <a:satMod val="164000"/>
+                <a:lumMod val="69000"/>
+              </a:schemeClr>
+              <a:schemeClr val="bg2">
+                <a:tint val="96000"/>
+                <a:hueMod val="90000"/>
+                <a:satMod val="130000"/>
+                <a:lumMod val="134000"/>
+              </a:schemeClr>
+            </a:duotone>
+          </a:blip>
+          <a:stretch/>
+        </a:blipFill>
+        <a:effectLst/>
+      </p:bgPr>
+    </p:bg>
+    <p:spTree>
+      <p:nvGrpSpPr>
+        <p:cNvPr id="1" name=""/>
+        <p:cNvGrpSpPr/>
+        <p:nvPr/>
+      </p:nvGrpSpPr>
+      <p:grpSpPr>
+        <a:xfrm>
+          <a:off x="0" y="0"/>
+          <a:ext cx="0" cy="0"/>
+          <a:chOff x="0" y="0"/>
+          <a:chExt cx="0" cy="0"/>
+        </a:xfrm>
+      </p:grpSpPr>
+      <p:pic>
+        <p:nvPicPr>
+          <p:cNvPr id="10" name="Picture 9">
+            <a:extLst>
+              <a:ext uri="{FF2B5EF4-FFF2-40B4-BE49-F238E27FC236}">
+                <a16:creationId xmlns:a16="http://schemas.microsoft.com/office/drawing/2014/main" id="{AA085689-791F-4B8F-9F30-12415B97D366}"/>
+              </a:ext>
+              <a:ext uri="{C183D7F6-B498-43B3-948B-1728B52AA6E4}">
+                <adec:decorative xmlns:adec="http://schemas.microsoft.com/office/drawing/2017/decorative" val="1"/>
+              </a:ext>
+            </a:extLst>
+          </p:cNvPr>
+          <p:cNvPicPr>
+            <a:picLocks noGrp="1" noRot="1" noChangeAspect="1" noMove="1" noResize="1" noEditPoints="1" noAdjustHandles="1" noChangeArrowheads="1" noChangeShapeType="1" noCrop="1"/>
+          </p:cNvPicPr>
+          <p:nvPr>
+            <p:extLst>
+              <p:ext uri="{386F3935-93C4-4BCD-93E2-E3B085C9AB24}">
+                <p16:designElem xmlns:p16="http://schemas.microsoft.com/office/powerpoint/2015/main" val="1"/>
+              </p:ext>
+            </p:extLst>
+          </p:nvPr>
+        </p:nvPicPr>
+        <p:blipFill rotWithShape="1">
+          <a:blip r:embed="rId3">
+            <a:extLst>
+              <a:ext uri="{28A0092B-C50C-407E-A947-70E740481C1C}">
+                <a14:useLocalDpi xmlns:a14="http://schemas.microsoft.com/office/drawing/2010/main" val="0"/>
+              </a:ext>
+            </a:extLst>
+          </a:blip>
+          <a:srcRect l="3613"/>
+          <a:stretch/>
+        </p:blipFill>
+        <p:spPr>
+          <a:xfrm>
+            <a:off x="0" y="2669685"/>
+            <a:ext cx="4037012" cy="4188315"/>
+          </a:xfrm>
+          <a:prstGeom prst="rect">
+            <a:avLst/>
+          </a:prstGeom>
+        </p:spPr>
+      </p:pic>
+      <p:pic>
+        <p:nvPicPr>
+          <p:cNvPr id="12" name="Picture 11">
+            <a:extLst>
+              <a:ext uri="{FF2B5EF4-FFF2-40B4-BE49-F238E27FC236}">
+                <a16:creationId xmlns:a16="http://schemas.microsoft.com/office/drawing/2014/main" id="{AA3FED7F-6821-47C0-A464-E9278B24129E}"/>
+              </a:ext>
+              <a:ext uri="{C183D7F6-B498-43B3-948B-1728B52AA6E4}">
+                <adec:decorative xmlns:adec="http://schemas.microsoft.com/office/drawing/2017/decorative" val="1"/>
+              </a:ext>
+            </a:extLst>
+          </p:cNvPr>
+          <p:cNvPicPr>
+            <a:picLocks noGrp="1" noRot="1" noChangeAspect="1" noMove="1" noResize="1" noEditPoints="1" noAdjustHandles="1" noChangeArrowheads="1" noChangeShapeType="1" noCrop="1"/>
+          </p:cNvPicPr>
+          <p:nvPr>
+            <p:extLst>
+              <p:ext uri="{386F3935-93C4-4BCD-93E2-E3B085C9AB24}">
+                <p16:designElem xmlns:p16="http://schemas.microsoft.com/office/powerpoint/2015/main" val="1"/>
+              </p:ext>
+            </p:extLst>
+          </p:nvPr>
+        </p:nvPicPr>
+        <p:blipFill rotWithShape="1">
+          <a:blip r:embed="rId4">
+            <a:extLst>
+              <a:ext uri="{28A0092B-C50C-407E-A947-70E740481C1C}">
+                <a14:useLocalDpi xmlns:a14="http://schemas.microsoft.com/office/drawing/2010/main" val="0"/>
+              </a:ext>
+            </a:extLst>
+          </a:blip>
+          <a:srcRect l="35640"/>
+          <a:stretch/>
+        </p:blipFill>
+        <p:spPr>
+          <a:xfrm>
+            <a:off x="0" y="2892347"/>
+            <a:ext cx="1522412" cy="2365453"/>
+          </a:xfrm>
+          <a:prstGeom prst="rect">
+            <a:avLst/>
+          </a:prstGeom>
+        </p:spPr>
+      </p:pic>
+      <p:sp>
+        <p:nvSpPr>
+          <p:cNvPr id="14" name="Oval 13">
+            <a:extLst>
+              <a:ext uri="{FF2B5EF4-FFF2-40B4-BE49-F238E27FC236}">
+                <a16:creationId xmlns:a16="http://schemas.microsoft.com/office/drawing/2014/main" id="{8F54B2FB-3F54-4350-8D1B-F86D677CA7ED}"/>
+              </a:ext>
+              <a:ext uri="{C183D7F6-B498-43B3-948B-1728B52AA6E4}">
+                <adec:decorative xmlns:adec="http://schemas.microsoft.com/office/drawing/2017/decorative" val="1"/>
+              </a:ext>
+            </a:extLst>
+          </p:cNvPr>
+          <p:cNvSpPr>
+            <a:spLocks noGrp="1" noRot="1" noChangeAspect="1" noMove="1" noResize="1" noEditPoints="1" noAdjustHandles="1" noChangeArrowheads="1" noChangeShapeType="1" noTextEdit="1"/>
+          </p:cNvSpPr>
+          <p:nvPr>
+            <p:extLst>
+              <p:ext uri="{386F3935-93C4-4BCD-93E2-E3B085C9AB24}">
+                <p16:designElem xmlns:p16="http://schemas.microsoft.com/office/powerpoint/2015/main" val="1"/>
+              </p:ext>
+            </p:extLst>
+          </p:nvPr>
+        </p:nvSpPr>
+        <p:spPr>
+          <a:xfrm>
+            <a:off x="8609012" y="1676400"/>
+            <a:ext cx="2819400" cy="2819400"/>
+          </a:xfrm>
+          <a:prstGeom prst="ellipse">
+            <a:avLst/>
+          </a:prstGeom>
+          <a:gradFill flip="none" rotWithShape="1">
+            <a:gsLst>
+              <a:gs pos="0">
+                <a:schemeClr val="bg2">
+                  <a:lumMod val="40000"/>
+                  <a:lumOff val="60000"/>
+                  <a:alpha val="7000"/>
+                </a:schemeClr>
+              </a:gs>
+              <a:gs pos="69000">
+                <a:schemeClr val="bg2">
+                  <a:lumMod val="40000"/>
+                  <a:lumOff val="60000"/>
+                  <a:alpha val="0"/>
+                </a:schemeClr>
+              </a:gs>
+              <a:gs pos="36000">
+                <a:schemeClr val="bg2">
+                  <a:lumMod val="40000"/>
+                  <a:lumOff val="60000"/>
+                  <a:alpha val="6000"/>
+                </a:schemeClr>
+              </a:gs>
+            </a:gsLst>
+            <a:path path="circle">
+              <a:fillToRect l="50000" t="50000" r="50000" b="50000"/>
+            </a:path>
+            <a:tileRect/>
+          </a:gradFill>
+          <a:ln>
+            <a:noFill/>
+          </a:ln>
+          <a:effectLst/>
+        </p:spPr>
+        <p:style>
+          <a:lnRef idx="1">
+            <a:schemeClr val="accent1"/>
+          </a:lnRef>
+          <a:fillRef idx="3">
+            <a:schemeClr val="accent1"/>
+          </a:fillRef>
+          <a:effectRef idx="2">
+            <a:schemeClr val="accent1"/>
+          </a:effectRef>
+          <a:fontRef idx="minor">
+            <a:schemeClr val="lt1"/>
+          </a:fontRef>
+        </p:style>
+      </p:sp>
+      <p:pic>
+        <p:nvPicPr>
+          <p:cNvPr id="16" name="Picture 15">
+            <a:extLst>
+              <a:ext uri="{FF2B5EF4-FFF2-40B4-BE49-F238E27FC236}">
                 <a16:creationId xmlns:a16="http://schemas.microsoft.com/office/drawing/2014/main" id="{561B34F5-88E5-4711-BC16-3005C29AD7C6}"/>
               </a:ext>
               <a:ext uri="{C183D7F6-B498-43B3-948B-1728B52AA6E4}">
@@ -9864,6 +11148,70 @@
     <p:extLst>
       <p:ext uri="{BB962C8B-B14F-4D97-AF65-F5344CB8AC3E}">
         <p14:creationId xmlns:p14="http://schemas.microsoft.com/office/powerpoint/2010/main" val="741672257"/>
+      </p:ext>
+    </p:extLst>
+  </p:cSld>
+  <p:clrMapOvr>
+    <a:masterClrMapping/>
+  </p:clrMapOvr>
+</p:sld>
+</file>
+
+<file path=ppt/slides/slide9.xml><?xml version="1.0" encoding="utf-8"?>
+<p:sld xmlns:a="http://schemas.openxmlformats.org/drawingml/2006/main" xmlns:r="http://schemas.openxmlformats.org/officeDocument/2006/relationships" xmlns:p="http://schemas.openxmlformats.org/presentationml/2006/main">
+  <p:cSld>
+    <p:spTree>
+      <p:nvGrpSpPr>
+        <p:cNvPr id="1" name=""/>
+        <p:cNvGrpSpPr/>
+        <p:nvPr/>
+      </p:nvGrpSpPr>
+      <p:grpSpPr>
+        <a:xfrm>
+          <a:off x="0" y="0"/>
+          <a:ext cx="0" cy="0"/>
+          <a:chOff x="0" y="0"/>
+          <a:chExt cx="0" cy="0"/>
+        </a:xfrm>
+      </p:grpSpPr>
+      <p:sp>
+        <p:nvSpPr>
+          <p:cNvPr id="2" name="Titel 1">
+            <a:extLst>
+              <a:ext uri="{FF2B5EF4-FFF2-40B4-BE49-F238E27FC236}">
+                <a16:creationId xmlns:a16="http://schemas.microsoft.com/office/drawing/2014/main" id="{BB202159-943E-4D8C-8C53-0F9EB5455DEB}"/>
+              </a:ext>
+            </a:extLst>
+          </p:cNvPr>
+          <p:cNvSpPr>
+            <a:spLocks noGrp="1"/>
+          </p:cNvSpPr>
+          <p:nvPr>
+            <p:ph type="title"/>
+          </p:nvPr>
+        </p:nvSpPr>
+        <p:spPr>
+          <a:xfrm>
+            <a:off x="1393638" y="3070670"/>
+            <a:ext cx="9404723" cy="716659"/>
+          </a:xfrm>
+        </p:spPr>
+        <p:txBody>
+          <a:bodyPr/>
+          <a:lstStyle/>
+          <a:p>
+            <a:pPr algn="ctr"/>
+            <a:r>
+              <a:rPr lang="de-DE" sz="4000" dirty="0"/>
+              <a:t>Danke für die Aufmerksamkeit!</a:t>
+            </a:r>
+          </a:p>
+        </p:txBody>
+      </p:sp>
+    </p:spTree>
+    <p:extLst>
+      <p:ext uri="{BB962C8B-B14F-4D97-AF65-F5344CB8AC3E}">
+        <p14:creationId xmlns:p14="http://schemas.microsoft.com/office/powerpoint/2010/main" val="1796291464"/>
       </p:ext>
     </p:extLst>
   </p:cSld>
@@ -10729,23 +12077,6 @@
 </file>
 
 <file path=customXml/item1.xml><?xml version="1.0" encoding="utf-8"?>
-<p:properties xmlns:p="http://schemas.microsoft.com/office/2006/metadata/properties" xmlns:xsi="http://www.w3.org/2001/XMLSchema-instance" xmlns:pc="http://schemas.microsoft.com/office/infopath/2007/PartnerControls">
-  <documentManagement>
-    <MediaServiceKeyPoints xmlns="71af3243-3dd4-4a8d-8c0d-dd76da1f02a5" xsi:nil="true"/>
-  </documentManagement>
-</p:properties>
-</file>
-
-<file path=customXml/item2.xml><?xml version="1.0" encoding="utf-8"?>
-<?mso-contentType ?>
-<FormTemplates xmlns="http://schemas.microsoft.com/sharepoint/v3/contenttype/forms">
-  <Display>DocumentLibraryForm</Display>
-  <Edit>DocumentLibraryForm</Edit>
-  <New>DocumentLibraryForm</New>
-</FormTemplates>
-</file>
-
-<file path=customXml/item3.xml><?xml version="1.0" encoding="utf-8"?>
 <ct:contentTypeSchema xmlns:ct="http://schemas.microsoft.com/office/2006/metadata/contentType" xmlns:ma="http://schemas.microsoft.com/office/2006/metadata/properties/metaAttributes" ct:_="" ma:_="" ma:contentTypeName="Document" ma:contentTypeID="0x01010079F111ED35F8CC479449609E8A0923A6" ma:contentTypeVersion="11" ma:contentTypeDescription="Create a new document." ma:contentTypeScope="" ma:versionID="1c2eb7a32e66fb6e4260f3771546a5e2">
   <xsd:schema xmlns:xsd="http://www.w3.org/2001/XMLSchema" xmlns:xs="http://www.w3.org/2001/XMLSchema" xmlns:p="http://schemas.microsoft.com/office/2006/metadata/properties" xmlns:ns2="71af3243-3dd4-4a8d-8c0d-dd76da1f02a5" xmlns:ns3="16c05727-aa75-4e4a-9b5f-8a80a1165891" targetNamespace="http://schemas.microsoft.com/office/2006/metadata/properties" ma:root="true" ma:fieldsID="04e1f6479c48b08974ba73b5ca973489" ns2:_="" ns3:_="">
     <xsd:import namespace="71af3243-3dd4-4a8d-8c0d-dd76da1f02a5"/>
@@ -10956,25 +12287,24 @@
 </ct:contentTypeSchema>
 </file>
 
-<file path=customXml/itemProps1.xml><?xml version="1.0" encoding="utf-8"?>
-<ds:datastoreItem xmlns:ds="http://schemas.openxmlformats.org/officeDocument/2006/customXml" ds:itemID="{5ACC4F44-154A-4E67-B129-1B5389E9F993}">
-  <ds:schemaRefs>
-    <ds:schemaRef ds:uri="http://schemas.microsoft.com/office/2006/metadata/properties"/>
-    <ds:schemaRef ds:uri="http://schemas.microsoft.com/office/infopath/2007/PartnerControls"/>
-    <ds:schemaRef ds:uri="71af3243-3dd4-4a8d-8c0d-dd76da1f02a5"/>
-  </ds:schemaRefs>
-</ds:datastoreItem>
+<file path=customXml/item2.xml><?xml version="1.0" encoding="utf-8"?>
+<?mso-contentType ?>
+<FormTemplates xmlns="http://schemas.microsoft.com/sharepoint/v3/contenttype/forms">
+  <Display>DocumentLibraryForm</Display>
+  <Edit>DocumentLibraryForm</Edit>
+  <New>DocumentLibraryForm</New>
+</FormTemplates>
 </file>
 
-<file path=customXml/itemProps2.xml><?xml version="1.0" encoding="utf-8"?>
-<ds:datastoreItem xmlns:ds="http://schemas.openxmlformats.org/officeDocument/2006/customXml" ds:itemID="{E6953E32-00D6-4FFB-AD6B-B2091BB3289C}">
-  <ds:schemaRefs>
-    <ds:schemaRef ds:uri="http://schemas.microsoft.com/sharepoint/v3/contenttype/forms"/>
-  </ds:schemaRefs>
-</ds:datastoreItem>
+<file path=customXml/item3.xml><?xml version="1.0" encoding="utf-8"?>
+<p:properties xmlns:p="http://schemas.microsoft.com/office/2006/metadata/properties" xmlns:xsi="http://www.w3.org/2001/XMLSchema-instance" xmlns:pc="http://schemas.microsoft.com/office/infopath/2007/PartnerControls">
+  <documentManagement>
+    <MediaServiceKeyPoints xmlns="71af3243-3dd4-4a8d-8c0d-dd76da1f02a5" xsi:nil="true"/>
+  </documentManagement>
+</p:properties>
 </file>
 
-<file path=customXml/itemProps3.xml><?xml version="1.0" encoding="utf-8"?>
+<file path=customXml/itemProps1.xml><?xml version="1.0" encoding="utf-8"?>
 <ds:datastoreItem xmlns:ds="http://schemas.openxmlformats.org/officeDocument/2006/customXml" ds:itemID="{AB5FFD32-E0A8-4E83-80B3-20612105D9EB}">
   <ds:schemaRefs>
     <ds:schemaRef ds:uri="http://schemas.microsoft.com/office/2006/metadata/contentType"/>
@@ -10991,4 +12321,22 @@
     <ds:schemaRef ds:uri="http://schemas.microsoft.com/internal/obd"/>
   </ds:schemaRefs>
 </ds:datastoreItem>
+</file>
+
+<file path=customXml/itemProps2.xml><?xml version="1.0" encoding="utf-8"?>
+<ds:datastoreItem xmlns:ds="http://schemas.openxmlformats.org/officeDocument/2006/customXml" ds:itemID="{E6953E32-00D6-4FFB-AD6B-B2091BB3289C}">
+  <ds:schemaRefs>
+    <ds:schemaRef ds:uri="http://schemas.microsoft.com/sharepoint/v3/contenttype/forms"/>
+  </ds:schemaRefs>
+</ds:datastoreItem>
+</file>
+
+<file path=customXml/itemProps3.xml><?xml version="1.0" encoding="utf-8"?>
+<ds:datastoreItem xmlns:ds="http://schemas.openxmlformats.org/officeDocument/2006/customXml" ds:itemID="{5ACC4F44-154A-4E67-B129-1B5389E9F993}">
+  <ds:schemaRefs>
+    <ds:schemaRef ds:uri="http://schemas.microsoft.com/office/2006/metadata/properties"/>
+    <ds:schemaRef ds:uri="http://schemas.microsoft.com/office/infopath/2007/PartnerControls"/>
+    <ds:schemaRef ds:uri="71af3243-3dd4-4a8d-8c0d-dd76da1f02a5"/>
+  </ds:schemaRefs>
+</ds:datastoreItem>
 </file>
</xml_diff>